<commit_message>
Created a few lectures.
</commit_message>
<xml_diff>
--- a/src/lectures/android-design-patterns/android-design-patterns.pptx
+++ b/src/lectures/android-design-patterns/android-design-patterns.pptx
@@ -214,7 +214,7 @@
           <a:p>
             <a:fld id="{6D65E8AE-67CB-425F-A941-9EF2C260E158}" type="datetimeFigureOut">
               <a:rPr lang="sv-SE" smtClean="0"/>
-              <a:t>2020-01-20</a:t>
+              <a:t>2020-01-24</a:t>
             </a:fld>
             <a:endParaRPr lang="sv-SE"/>
           </a:p>
@@ -379,7 +379,7 @@
           <a:p>
             <a:fld id="{38366049-D807-473D-9795-762417EEF104}" type="datetimeFigureOut">
               <a:rPr lang="en-US" smtClean="0"/>
-              <a:t>1/20/2020</a:t>
+              <a:t>1/24/2020</a:t>
             </a:fld>
             <a:endParaRPr lang="en-US"/>
           </a:p>
@@ -688,7 +688,7 @@
           <a:p>
             <a:fld id="{428859CC-B640-4DB3-BB6F-301CDED75AAD}" type="datetimeFigureOut">
               <a:rPr lang="sv-SE" smtClean="0"/>
-              <a:t>2020-01-20</a:t>
+              <a:t>2020-01-24</a:t>
             </a:fld>
             <a:endParaRPr lang="sv-SE"/>
           </a:p>
@@ -1038,7 +1038,7 @@
           <a:p>
             <a:fld id="{428859CC-B640-4DB3-BB6F-301CDED75AAD}" type="datetimeFigureOut">
               <a:rPr lang="sv-SE" smtClean="0"/>
-              <a:t>2020-01-20</a:t>
+              <a:t>2020-01-24</a:t>
             </a:fld>
             <a:endParaRPr lang="sv-SE"/>
           </a:p>
@@ -1288,7 +1288,7 @@
           <a:p>
             <a:fld id="{428859CC-B640-4DB3-BB6F-301CDED75AAD}" type="datetimeFigureOut">
               <a:rPr lang="sv-SE" smtClean="0"/>
-              <a:t>2020-01-20</a:t>
+              <a:t>2020-01-24</a:t>
             </a:fld>
             <a:endParaRPr lang="sv-SE"/>
           </a:p>
@@ -1647,7 +1647,7 @@
           <a:p>
             <a:fld id="{428859CC-B640-4DB3-BB6F-301CDED75AAD}" type="datetimeFigureOut">
               <a:rPr lang="sv-SE" smtClean="0"/>
-              <a:t>2020-01-20</a:t>
+              <a:t>2020-01-24</a:t>
             </a:fld>
             <a:endParaRPr lang="sv-SE"/>
           </a:p>
@@ -1998,7 +1998,7 @@
           <a:p>
             <a:fld id="{428859CC-B640-4DB3-BB6F-301CDED75AAD}" type="datetimeFigureOut">
               <a:rPr lang="sv-SE" smtClean="0"/>
-              <a:t>2020-01-20</a:t>
+              <a:t>2020-01-24</a:t>
             </a:fld>
             <a:endParaRPr lang="sv-SE"/>
           </a:p>
@@ -2430,7 +2430,7 @@
           <a:p>
             <a:fld id="{428859CC-B640-4DB3-BB6F-301CDED75AAD}" type="datetimeFigureOut">
               <a:rPr lang="sv-SE" smtClean="0"/>
-              <a:t>2020-01-20</a:t>
+              <a:t>2020-01-24</a:t>
             </a:fld>
             <a:endParaRPr lang="sv-SE"/>
           </a:p>
@@ -2854,7 +2854,7 @@
           <a:p>
             <a:fld id="{428859CC-B640-4DB3-BB6F-301CDED75AAD}" type="datetimeFigureOut">
               <a:rPr lang="sv-SE" smtClean="0"/>
-              <a:t>2020-01-20</a:t>
+              <a:t>2020-01-24</a:t>
             </a:fld>
             <a:endParaRPr lang="sv-SE"/>
           </a:p>
@@ -3286,7 +3286,7 @@
           <a:p>
             <a:fld id="{428859CC-B640-4DB3-BB6F-301CDED75AAD}" type="datetimeFigureOut">
               <a:rPr lang="sv-SE" smtClean="0"/>
-              <a:t>2020-01-20</a:t>
+              <a:t>2020-01-24</a:t>
             </a:fld>
             <a:endParaRPr lang="sv-SE"/>
           </a:p>
@@ -3612,7 +3612,7 @@
           <a:p>
             <a:fld id="{428859CC-B640-4DB3-BB6F-301CDED75AAD}" type="datetimeFigureOut">
               <a:rPr lang="sv-SE" smtClean="0"/>
-              <a:t>2020-01-20</a:t>
+              <a:t>2020-01-24</a:t>
             </a:fld>
             <a:endParaRPr lang="sv-SE"/>
           </a:p>
@@ -3812,7 +3812,7 @@
           <a:p>
             <a:fld id="{428859CC-B640-4DB3-BB6F-301CDED75AAD}" type="datetimeFigureOut">
               <a:rPr lang="sv-SE" smtClean="0"/>
-              <a:t>2020-01-20</a:t>
+              <a:t>2020-01-24</a:t>
             </a:fld>
             <a:endParaRPr lang="sv-SE"/>
           </a:p>
@@ -3973,7 +3973,7 @@
           <a:p>
             <a:fld id="{428859CC-B640-4DB3-BB6F-301CDED75AAD}" type="datetimeFigureOut">
               <a:rPr lang="sv-SE" smtClean="0"/>
-              <a:t>2020-01-20</a:t>
+              <a:t>2020-01-24</a:t>
             </a:fld>
             <a:endParaRPr lang="sv-SE"/>
           </a:p>
@@ -4241,7 +4241,7 @@
           <a:p>
             <a:fld id="{428859CC-B640-4DB3-BB6F-301CDED75AAD}" type="datetimeFigureOut">
               <a:rPr lang="sv-SE" smtClean="0"/>
-              <a:t>2020-01-20</a:t>
+              <a:t>2020-01-24</a:t>
             </a:fld>
             <a:endParaRPr lang="sv-SE"/>
           </a:p>
@@ -4446,7 +4446,7 @@
           <a:p>
             <a:fld id="{428859CC-B640-4DB3-BB6F-301CDED75AAD}" type="datetimeFigureOut">
               <a:rPr lang="sv-SE" smtClean="0"/>
-              <a:t>2020-01-20</a:t>
+              <a:t>2020-01-24</a:t>
             </a:fld>
             <a:endParaRPr lang="sv-SE"/>
           </a:p>
@@ -4668,7 +4668,7 @@
           <a:p>
             <a:fld id="{428859CC-B640-4DB3-BB6F-301CDED75AAD}" type="datetimeFigureOut">
               <a:rPr lang="sv-SE" smtClean="0"/>
-              <a:t>2020-01-20</a:t>
+              <a:t>2020-01-24</a:t>
             </a:fld>
             <a:endParaRPr lang="sv-SE"/>
           </a:p>
@@ -4902,7 +4902,7 @@
           <a:p>
             <a:fld id="{428859CC-B640-4DB3-BB6F-301CDED75AAD}" type="datetimeFigureOut">
               <a:rPr lang="sv-SE" smtClean="0"/>
-              <a:t>2020-01-20</a:t>
+              <a:t>2020-01-24</a:t>
             </a:fld>
             <a:endParaRPr lang="sv-SE"/>
           </a:p>
@@ -5124,7 +5124,7 @@
           <a:p>
             <a:fld id="{428859CC-B640-4DB3-BB6F-301CDED75AAD}" type="datetimeFigureOut">
               <a:rPr lang="sv-SE" smtClean="0"/>
-              <a:t>2020-01-20</a:t>
+              <a:t>2020-01-24</a:t>
             </a:fld>
             <a:endParaRPr lang="sv-SE"/>
           </a:p>
@@ -5358,7 +5358,7 @@
           <a:p>
             <a:fld id="{428859CC-B640-4DB3-BB6F-301CDED75AAD}" type="datetimeFigureOut">
               <a:rPr lang="sv-SE" smtClean="0"/>
-              <a:t>2020-01-20</a:t>
+              <a:t>2020-01-24</a:t>
             </a:fld>
             <a:endParaRPr lang="sv-SE"/>
           </a:p>
@@ -5772,7 +5772,7 @@
           <a:p>
             <a:fld id="{428859CC-B640-4DB3-BB6F-301CDED75AAD}" type="datetimeFigureOut">
               <a:rPr lang="sv-SE" smtClean="0"/>
-              <a:t>2020-01-20</a:t>
+              <a:t>2020-01-24</a:t>
             </a:fld>
             <a:endParaRPr lang="sv-SE"/>
           </a:p>
@@ -6184,7 +6184,7 @@
           <a:p>
             <a:fld id="{428859CC-B640-4DB3-BB6F-301CDED75AAD}" type="datetimeFigureOut">
               <a:rPr lang="sv-SE" smtClean="0"/>
-              <a:t>2020-01-20</a:t>
+              <a:t>2020-01-24</a:t>
             </a:fld>
             <a:endParaRPr lang="sv-SE"/>
           </a:p>
@@ -6501,7 +6501,7 @@
           <a:p>
             <a:fld id="{428859CC-B640-4DB3-BB6F-301CDED75AAD}" type="datetimeFigureOut">
               <a:rPr lang="sv-SE" smtClean="0"/>
-              <a:t>2020-01-20</a:t>
+              <a:t>2020-01-24</a:t>
             </a:fld>
             <a:endParaRPr lang="sv-SE"/>
           </a:p>
@@ -6816,7 +6816,7 @@
           <a:p>
             <a:fld id="{428859CC-B640-4DB3-BB6F-301CDED75AAD}" type="datetimeFigureOut">
               <a:rPr lang="sv-SE" smtClean="0"/>
-              <a:t>2020-01-20</a:t>
+              <a:t>2020-01-24</a:t>
             </a:fld>
             <a:endParaRPr lang="sv-SE"/>
           </a:p>
@@ -7104,7 +7104,7 @@
           <a:p>
             <a:fld id="{428859CC-B640-4DB3-BB6F-301CDED75AAD}" type="datetimeFigureOut">
               <a:rPr lang="sv-SE" smtClean="0"/>
-              <a:t>2020-01-20</a:t>
+              <a:t>2020-01-24</a:t>
             </a:fld>
             <a:endParaRPr lang="sv-SE"/>
           </a:p>
@@ -7406,7 +7406,7 @@
           <a:p>
             <a:fld id="{428859CC-B640-4DB3-BB6F-301CDED75AAD}" type="datetimeFigureOut">
               <a:rPr lang="sv-SE" smtClean="0"/>
-              <a:t>2020-01-20</a:t>
+              <a:t>2020-01-24</a:t>
             </a:fld>
             <a:endParaRPr lang="sv-SE"/>
           </a:p>
@@ -7688,7 +7688,7 @@
           <a:p>
             <a:fld id="{428859CC-B640-4DB3-BB6F-301CDED75AAD}" type="datetimeFigureOut">
               <a:rPr lang="sv-SE" smtClean="0"/>
-              <a:t>2020-01-20</a:t>
+              <a:t>2020-01-24</a:t>
             </a:fld>
             <a:endParaRPr lang="sv-SE"/>
           </a:p>

</xml_diff>